<commit_message>
jbons matrnr und aktualisierten screenshot eingefügt
</commit_message>
<xml_diff>
--- a/aws_ha1.pptx
+++ b/aws_ha1.pptx
@@ -176,6 +176,10 @@
 </p:presentation>
 </file>
 
+<file path=ppt/revisionInfo.xml><?xml version="1.0" encoding="utf-8"?>
+<p1510:revInfo xmlns:a="http://schemas.openxmlformats.org/drawingml/2006/main" xmlns:r="http://schemas.openxmlformats.org/officeDocument/2006/relationships" xmlns:p1510="http://schemas.microsoft.com/office/powerpoint/2015/10/main"/>
+</file>
+
 <file path=ppt/notesMasters/notesMaster1.xml><?xml version="1.0" encoding="utf-8"?>
 <p:notesMaster xmlns:a="http://schemas.openxmlformats.org/drawingml/2006/main" xmlns:r="http://schemas.openxmlformats.org/officeDocument/2006/relationships" xmlns:p="http://schemas.openxmlformats.org/presentationml/2006/main">
   <p:cSld>
@@ -792,7 +796,7 @@
           <a:graphicData uri="http://schemas.openxmlformats.org/presentationml/2006/ole">
             <mc:AlternateContent xmlns:mc="http://schemas.openxmlformats.org/markup-compatibility/2006">
               <mc:Choice xmlns:v="urn:schemas-microsoft-com:vml" Requires="v">
-                <p:oleObj spid="_x0000_s4163" r:id="rId9" imgW="0" imgH="0" progId="TCLayout.ActiveDocument.1">
+                <p:oleObj spid="_x0000_s4164" r:id="rId9" imgW="0" imgH="0" progId="TCLayout.ActiveDocument.1">
                   <p:embed/>
                 </p:oleObj>
               </mc:Choice>
@@ -3336,7 +3340,7 @@
           <a:graphicData uri="http://schemas.openxmlformats.org/presentationml/2006/ole">
             <mc:AlternateContent xmlns:mc="http://schemas.openxmlformats.org/markup-compatibility/2006">
               <mc:Choice xmlns:v="urn:schemas-microsoft-com:vml" Requires="v">
-                <p:oleObj spid="_x0000_s1095" r:id="rId21" imgW="0" imgH="0" progId="TCLayout.ActiveDocument.1">
+                <p:oleObj spid="_x0000_s1096" r:id="rId21" imgW="0" imgH="0" progId="TCLayout.ActiveDocument.1">
                   <p:embed/>
                 </p:oleObj>
               </mc:Choice>
@@ -4016,7 +4020,7 @@
           <a:graphicData uri="http://schemas.openxmlformats.org/presentationml/2006/ole">
             <mc:AlternateContent xmlns:mc="http://schemas.openxmlformats.org/markup-compatibility/2006">
               <mc:Choice xmlns:v="urn:schemas-microsoft-com:vml" Requires="v">
-                <p:oleObj spid="_x0000_s28686" name="Image" r:id="rId3" imgW="19974600" imgH="11314080" progId="Photoshop.Image.15">
+                <p:oleObj spid="_x0000_s28689" name="Image" r:id="rId3" imgW="19974600" imgH="11314080" progId="Photoshop.Image.15">
                   <p:embed/>
                 </p:oleObj>
               </mc:Choice>
@@ -4392,7 +4396,7 @@
           <a:graphicData uri="http://schemas.openxmlformats.org/presentationml/2006/ole">
             <mc:AlternateContent xmlns:mc="http://schemas.openxmlformats.org/markup-compatibility/2006">
               <mc:Choice xmlns:v="urn:schemas-microsoft-com:vml" Requires="v">
-                <p:oleObj spid="_x0000_s28687" name="Image" r:id="rId5" imgW="3758400" imgH="7085520" progId="Photoshop.Image.15">
+                <p:oleObj spid="_x0000_s28690" name="Image" r:id="rId5" imgW="3758400" imgH="7085520" progId="Photoshop.Image.15">
                   <p:embed/>
                 </p:oleObj>
               </mc:Choice>
@@ -4483,7 +4487,7 @@
           <a:graphicData uri="http://schemas.openxmlformats.org/presentationml/2006/ole">
             <mc:AlternateContent xmlns:mc="http://schemas.openxmlformats.org/markup-compatibility/2006">
               <mc:Choice xmlns:v="urn:schemas-microsoft-com:vml" Requires="v">
-                <p:oleObj spid="_x0000_s28688" name="Image" r:id="rId7" imgW="4977720" imgH="3656880" progId="Photoshop.Image.15">
+                <p:oleObj spid="_x0000_s28691" name="Image" r:id="rId7" imgW="4977720" imgH="3656880" progId="Photoshop.Image.15">
                   <p:embed/>
                 </p:oleObj>
               </mc:Choice>
@@ -5167,7 +5171,7 @@
           <a:graphicData uri="http://schemas.openxmlformats.org/presentationml/2006/ole">
             <mc:AlternateContent xmlns:mc="http://schemas.openxmlformats.org/markup-compatibility/2006">
               <mc:Choice xmlns:v="urn:schemas-microsoft-com:vml" Requires="v">
-                <p:oleObj spid="_x0000_s29704" name="Image" r:id="rId3" imgW="24304680" imgH="11491920" progId="Photoshop.Image.15">
+                <p:oleObj spid="_x0000_s29705" name="Image" r:id="rId3" imgW="24304680" imgH="11491920" progId="Photoshop.Image.15">
                   <p:embed/>
                 </p:oleObj>
               </mc:Choice>
@@ -5916,7 +5920,7 @@
           <a:graphicData uri="http://schemas.openxmlformats.org/presentationml/2006/ole">
             <mc:AlternateContent xmlns:mc="http://schemas.openxmlformats.org/markup-compatibility/2006">
               <mc:Choice xmlns:v="urn:schemas-microsoft-com:vml" Requires="v">
-                <p:oleObj spid="_x0000_s30742" name="Image" r:id="rId3" imgW="4926960" imgH="2768040" progId="Photoshop.Image.15">
+                <p:oleObj spid="_x0000_s30746" name="Image" r:id="rId3" imgW="4926960" imgH="2768040" progId="Photoshop.Image.15">
                   <p:embed/>
                 </p:oleObj>
               </mc:Choice>
@@ -5974,7 +5978,7 @@
           <a:graphicData uri="http://schemas.openxmlformats.org/presentationml/2006/ole">
             <mc:AlternateContent xmlns:mc="http://schemas.openxmlformats.org/markup-compatibility/2006">
               <mc:Choice xmlns:v="urn:schemas-microsoft-com:vml" Requires="v">
-                <p:oleObj spid="_x0000_s30743" name="Image" r:id="rId5" imgW="7885440" imgH="1180800" progId="Photoshop.Image.15">
+                <p:oleObj spid="_x0000_s30747" name="Image" r:id="rId5" imgW="7885440" imgH="1180800" progId="Photoshop.Image.15">
                   <p:embed/>
                 </p:oleObj>
               </mc:Choice>
@@ -6031,7 +6035,7 @@
           <a:graphicData uri="http://schemas.openxmlformats.org/presentationml/2006/ole">
             <mc:AlternateContent xmlns:mc="http://schemas.openxmlformats.org/markup-compatibility/2006">
               <mc:Choice xmlns:v="urn:schemas-microsoft-com:vml" Requires="v">
-                <p:oleObj spid="_x0000_s30744" name="Image" r:id="rId7" imgW="7542720" imgH="1231560" progId="Photoshop.Image.15">
+                <p:oleObj spid="_x0000_s30748" name="Image" r:id="rId7" imgW="7542720" imgH="1231560" progId="Photoshop.Image.15">
                   <p:embed/>
                 </p:oleObj>
               </mc:Choice>
@@ -6088,7 +6092,7 @@
           <a:graphicData uri="http://schemas.openxmlformats.org/presentationml/2006/ole">
             <mc:AlternateContent xmlns:mc="http://schemas.openxmlformats.org/markup-compatibility/2006">
               <mc:Choice xmlns:v="urn:schemas-microsoft-com:vml" Requires="v">
-                <p:oleObj spid="_x0000_s30745" name="Image" r:id="rId9" imgW="8507880" imgH="1244160" progId="Photoshop.Image.15">
+                <p:oleObj spid="_x0000_s30749" name="Image" r:id="rId9" imgW="8507880" imgH="1244160" progId="Photoshop.Image.15">
                   <p:embed/>
                 </p:oleObj>
               </mc:Choice>
@@ -6514,7 +6518,7 @@
                   <a:srgbClr val="C50E1F"/>
                 </a:solidFill>
               </a:rPr>
-              <a:t> (3)</a:t>
+              <a:t> (4)</a:t>
             </a:r>
           </a:p>
           <a:p>
@@ -6706,7 +6710,7 @@
           <a:graphicData uri="http://schemas.openxmlformats.org/presentationml/2006/ole">
             <mc:AlternateContent xmlns:mc="http://schemas.openxmlformats.org/markup-compatibility/2006">
               <mc:Choice xmlns:v="urn:schemas-microsoft-com:vml" Requires="v">
-                <p:oleObj spid="_x0000_s31754" name="Image" r:id="rId3" imgW="4926960" imgH="2768040" progId="Photoshop.Image.15">
+                <p:oleObj spid="_x0000_s31756" name="Image" r:id="rId3" imgW="4926960" imgH="2768040" progId="Photoshop.Image.15">
                   <p:embed/>
                 </p:oleObj>
               </mc:Choice>
@@ -6996,7 +7000,7 @@
           <a:graphicData uri="http://schemas.openxmlformats.org/presentationml/2006/ole">
             <mc:AlternateContent xmlns:mc="http://schemas.openxmlformats.org/markup-compatibility/2006">
               <mc:Choice xmlns:v="urn:schemas-microsoft-com:vml" Requires="v">
-                <p:oleObj spid="_x0000_s31755" name="Image" r:id="rId5" imgW="19110960" imgH="2247480" progId="Photoshop.Image.15">
+                <p:oleObj spid="_x0000_s31757" name="Image" r:id="rId5" imgW="19110960" imgH="2247480" progId="Photoshop.Image.15">
                   <p:embed/>
                 </p:oleObj>
               </mc:Choice>
@@ -7061,6 +7065,63 @@
           <a:chExt cx="0" cy="0"/>
         </a:xfrm>
       </p:grpSpPr>
+      <p:graphicFrame>
+        <p:nvGraphicFramePr>
+          <p:cNvPr id="4" name="Objekt 3"/>
+          <p:cNvGraphicFramePr>
+            <a:graphicFrameLocks noChangeAspect="1"/>
+          </p:cNvGraphicFramePr>
+          <p:nvPr>
+            <p:extLst>
+              <p:ext uri="{D42A27DB-BD31-4B8C-83A1-F6EECF244321}">
+                <p14:modId xmlns:p14="http://schemas.microsoft.com/office/powerpoint/2010/main" val="370291319"/>
+              </p:ext>
+            </p:extLst>
+          </p:nvPr>
+        </p:nvGraphicFramePr>
+        <p:xfrm>
+          <a:off x="3332253" y="2672529"/>
+          <a:ext cx="5823773" cy="2019300"/>
+        </p:xfrm>
+        <a:graphic>
+          <a:graphicData uri="http://schemas.openxmlformats.org/presentationml/2006/ole">
+            <mc:AlternateContent xmlns:mc="http://schemas.openxmlformats.org/markup-compatibility/2006">
+              <mc:Choice xmlns:v="urn:schemas-microsoft-com:vml" Requires="v">
+                <p:oleObj spid="_x0000_s32778" name="Image" r:id="rId3" imgW="12304440" imgH="3999960" progId="Photoshop.Image.15">
+                  <p:embed/>
+                </p:oleObj>
+              </mc:Choice>
+              <mc:Fallback>
+                <p:oleObj name="Image" r:id="rId3" imgW="12304440" imgH="3999960" progId="Photoshop.Image.15">
+                  <p:embed/>
+                  <p:pic>
+                    <p:nvPicPr>
+                      <p:cNvPr id="0" name=""/>
+                      <p:cNvPicPr/>
+                      <p:nvPr/>
+                    </p:nvPicPr>
+                    <p:blipFill>
+                      <a:blip r:embed="rId4"/>
+                      <a:stretch>
+                        <a:fillRect/>
+                      </a:stretch>
+                    </p:blipFill>
+                    <p:spPr>
+                      <a:xfrm>
+                        <a:off x="3332253" y="2672529"/>
+                        <a:ext cx="5823773" cy="2019300"/>
+                      </a:xfrm>
+                      <a:prstGeom prst="rect">
+                        <a:avLst/>
+                      </a:prstGeom>
+                    </p:spPr>
+                  </p:pic>
+                </p:oleObj>
+              </mc:Fallback>
+            </mc:AlternateContent>
+          </a:graphicData>
+        </a:graphic>
+      </p:graphicFrame>
       <p:sp>
         <p:nvSpPr>
           <p:cNvPr id="3" name="Inhaltsplatzhalter 2"/>
@@ -7111,7 +7172,7 @@
                   <a:srgbClr val="C50E1F"/>
                 </a:solidFill>
               </a:rPr>
-              <a:t> (3)</a:t>
+              <a:t> (5)</a:t>
             </a:r>
           </a:p>
           <a:p>
@@ -7309,12 +7370,12 @@
           <a:graphicData uri="http://schemas.openxmlformats.org/presentationml/2006/ole">
             <mc:AlternateContent xmlns:mc="http://schemas.openxmlformats.org/markup-compatibility/2006">
               <mc:Choice xmlns:v="urn:schemas-microsoft-com:vml" Requires="v">
-                <p:oleObj spid="_x0000_s32776" name="Image" r:id="rId3" imgW="4926960" imgH="2768040" progId="Photoshop.Image.15">
+                <p:oleObj spid="_x0000_s32779" name="Image" r:id="rId5" imgW="4926960" imgH="2768040" progId="Photoshop.Image.15">
                   <p:embed/>
                 </p:oleObj>
               </mc:Choice>
               <mc:Fallback>
-                <p:oleObj name="Image" r:id="rId3" imgW="4926960" imgH="2768040" progId="Photoshop.Image.15">
+                <p:oleObj name="Image" r:id="rId5" imgW="4926960" imgH="2768040" progId="Photoshop.Image.15">
                   <p:embed/>
                   <p:pic>
                     <p:nvPicPr>
@@ -7323,7 +7384,7 @@
                       <p:nvPr/>
                     </p:nvPicPr>
                     <p:blipFill>
-                      <a:blip r:embed="rId4"/>
+                      <a:blip r:embed="rId6"/>
                       <a:stretch>
                         <a:fillRect/>
                       </a:stretch>
@@ -7453,63 +7514,6 @@
           </a:p>
         </p:txBody>
       </p:sp>
-      <p:graphicFrame>
-        <p:nvGraphicFramePr>
-          <p:cNvPr id="7" name="Objekt 6"/>
-          <p:cNvGraphicFramePr>
-            <a:graphicFrameLocks noChangeAspect="1"/>
-          </p:cNvGraphicFramePr>
-          <p:nvPr>
-            <p:extLst>
-              <p:ext uri="{D42A27DB-BD31-4B8C-83A1-F6EECF244321}">
-                <p14:modId xmlns:p14="http://schemas.microsoft.com/office/powerpoint/2010/main" val="33163531"/>
-              </p:ext>
-            </p:extLst>
-          </p:nvPr>
-        </p:nvGraphicFramePr>
-        <p:xfrm>
-          <a:off x="3274146" y="2738678"/>
-          <a:ext cx="5835650" cy="1981200"/>
-        </p:xfrm>
-        <a:graphic>
-          <a:graphicData uri="http://schemas.openxmlformats.org/presentationml/2006/ole">
-            <mc:AlternateContent xmlns:mc="http://schemas.openxmlformats.org/markup-compatibility/2006">
-              <mc:Choice xmlns:v="urn:schemas-microsoft-com:vml" Requires="v">
-                <p:oleObj spid="_x0000_s32777" name="Image" r:id="rId5" imgW="11606040" imgH="3923640" progId="Photoshop.Image.15">
-                  <p:embed/>
-                </p:oleObj>
-              </mc:Choice>
-              <mc:Fallback>
-                <p:oleObj name="Image" r:id="rId5" imgW="11606040" imgH="3923640" progId="Photoshop.Image.15">
-                  <p:embed/>
-                  <p:pic>
-                    <p:nvPicPr>
-                      <p:cNvPr id="0" name=""/>
-                      <p:cNvPicPr/>
-                      <p:nvPr/>
-                    </p:nvPicPr>
-                    <p:blipFill>
-                      <a:blip r:embed="rId6"/>
-                      <a:stretch>
-                        <a:fillRect/>
-                      </a:stretch>
-                    </p:blipFill>
-                    <p:spPr>
-                      <a:xfrm>
-                        <a:off x="3274146" y="2738678"/>
-                        <a:ext cx="5835650" cy="1981200"/>
-                      </a:xfrm>
-                      <a:prstGeom prst="rect">
-                        <a:avLst/>
-                      </a:prstGeom>
-                    </p:spPr>
-                  </p:pic>
-                </p:oleObj>
-              </mc:Fallback>
-            </mc:AlternateContent>
-          </a:graphicData>
-        </a:graphic>
-      </p:graphicFrame>
       <p:cxnSp>
         <p:nvCxnSpPr>
           <p:cNvPr id="16" name="Gerade Verbindung mit Pfeil 15"/>
@@ -7912,7 +7916,7 @@
           <a:graphicData uri="http://schemas.openxmlformats.org/presentationml/2006/ole">
             <mc:AlternateContent xmlns:mc="http://schemas.openxmlformats.org/markup-compatibility/2006">
               <mc:Choice xmlns:v="urn:schemas-microsoft-com:vml" Requires="v">
-                <p:oleObj spid="_x0000_s33797" name="Image" r:id="rId3" imgW="23415840" imgH="11504520" progId="Photoshop.Image.15">
+                <p:oleObj spid="_x0000_s33798" name="Image" r:id="rId3" imgW="23415840" imgH="11504520" progId="Photoshop.Image.15">
                   <p:embed/>
                 </p:oleObj>
               </mc:Choice>
@@ -7977,6 +7981,63 @@
           <a:chExt cx="0" cy="0"/>
         </a:xfrm>
       </p:grpSpPr>
+      <p:graphicFrame>
+        <p:nvGraphicFramePr>
+          <p:cNvPr id="4" name="Objekt 3"/>
+          <p:cNvGraphicFramePr>
+            <a:graphicFrameLocks noChangeAspect="1"/>
+          </p:cNvGraphicFramePr>
+          <p:nvPr>
+            <p:extLst>
+              <p:ext uri="{D42A27DB-BD31-4B8C-83A1-F6EECF244321}">
+                <p14:modId xmlns:p14="http://schemas.microsoft.com/office/powerpoint/2010/main" val="3175217271"/>
+              </p:ext>
+            </p:extLst>
+          </p:nvPr>
+        </p:nvGraphicFramePr>
+        <p:xfrm>
+          <a:off x="179512" y="2003792"/>
+          <a:ext cx="8784976" cy="4255223"/>
+        </p:xfrm>
+        <a:graphic>
+          <a:graphicData uri="http://schemas.openxmlformats.org/presentationml/2006/ole">
+            <mc:AlternateContent xmlns:mc="http://schemas.openxmlformats.org/markup-compatibility/2006">
+              <mc:Choice xmlns:v="urn:schemas-microsoft-com:vml" Requires="v">
+                <p:oleObj spid="_x0000_s34821" name="Image" r:id="rId3" imgW="24152040" imgH="11669760" progId="Photoshop.Image.15">
+                  <p:embed/>
+                </p:oleObj>
+              </mc:Choice>
+              <mc:Fallback>
+                <p:oleObj name="Image" r:id="rId3" imgW="24152040" imgH="11669760" progId="Photoshop.Image.15">
+                  <p:embed/>
+                  <p:pic>
+                    <p:nvPicPr>
+                      <p:cNvPr id="0" name=""/>
+                      <p:cNvPicPr/>
+                      <p:nvPr/>
+                    </p:nvPicPr>
+                    <p:blipFill>
+                      <a:blip r:embed="rId4"/>
+                      <a:stretch>
+                        <a:fillRect/>
+                      </a:stretch>
+                    </p:blipFill>
+                    <p:spPr>
+                      <a:xfrm>
+                        <a:off x="179512" y="2003792"/>
+                        <a:ext cx="8784976" cy="4255223"/>
+                      </a:xfrm>
+                      <a:prstGeom prst="rect">
+                        <a:avLst/>
+                      </a:prstGeom>
+                    </p:spPr>
+                  </p:pic>
+                </p:oleObj>
+              </mc:Fallback>
+            </mc:AlternateContent>
+          </a:graphicData>
+        </a:graphic>
+      </p:graphicFrame>
       <p:sp>
         <p:nvSpPr>
           <p:cNvPr id="3" name="Inhaltsplatzhalter 2"/>
@@ -8170,63 +8231,6 @@
           </a:p>
         </p:txBody>
       </p:sp>
-      <p:graphicFrame>
-        <p:nvGraphicFramePr>
-          <p:cNvPr id="2" name="Objekt 1"/>
-          <p:cNvGraphicFramePr>
-            <a:graphicFrameLocks noChangeAspect="1"/>
-          </p:cNvGraphicFramePr>
-          <p:nvPr>
-            <p:extLst>
-              <p:ext uri="{D42A27DB-BD31-4B8C-83A1-F6EECF244321}">
-                <p14:modId xmlns:p14="http://schemas.microsoft.com/office/powerpoint/2010/main" val="1422971398"/>
-              </p:ext>
-            </p:extLst>
-          </p:nvPr>
-        </p:nvGraphicFramePr>
-        <p:xfrm>
-          <a:off x="395536" y="2009987"/>
-          <a:ext cx="8267364" cy="4019576"/>
-        </p:xfrm>
-        <a:graphic>
-          <a:graphicData uri="http://schemas.openxmlformats.org/presentationml/2006/ole">
-            <mc:AlternateContent xmlns:mc="http://schemas.openxmlformats.org/markup-compatibility/2006">
-              <mc:Choice xmlns:v="urn:schemas-microsoft-com:vml" Requires="v">
-                <p:oleObj spid="_x0000_s34820" name="Image" r:id="rId3" imgW="24063480" imgH="11669760" progId="Photoshop.Image.15">
-                  <p:embed/>
-                </p:oleObj>
-              </mc:Choice>
-              <mc:Fallback>
-                <p:oleObj name="Image" r:id="rId3" imgW="24063480" imgH="11669760" progId="Photoshop.Image.15">
-                  <p:embed/>
-                  <p:pic>
-                    <p:nvPicPr>
-                      <p:cNvPr id="0" name=""/>
-                      <p:cNvPicPr/>
-                      <p:nvPr/>
-                    </p:nvPicPr>
-                    <p:blipFill>
-                      <a:blip r:embed="rId4"/>
-                      <a:stretch>
-                        <a:fillRect/>
-                      </a:stretch>
-                    </p:blipFill>
-                    <p:spPr>
-                      <a:xfrm>
-                        <a:off x="395536" y="2009987"/>
-                        <a:ext cx="8267364" cy="4019576"/>
-                      </a:xfrm>
-                      <a:prstGeom prst="rect">
-                        <a:avLst/>
-                      </a:prstGeom>
-                    </p:spPr>
-                  </p:pic>
-                </p:oleObj>
-              </mc:Fallback>
-            </mc:AlternateContent>
-          </a:graphicData>
-        </a:graphic>
-      </p:graphicFrame>
     </p:spTree>
     <p:extLst>
       <p:ext uri="{BB962C8B-B14F-4D97-AF65-F5344CB8AC3E}">
@@ -8472,7 +8476,7 @@
           <a:graphicData uri="http://schemas.openxmlformats.org/presentationml/2006/ole">
             <mc:AlternateContent xmlns:mc="http://schemas.openxmlformats.org/markup-compatibility/2006">
               <mc:Choice xmlns:v="urn:schemas-microsoft-com:vml" Requires="v">
-                <p:oleObj spid="_x0000_s35843" name="Image" r:id="rId3" imgW="23834880" imgH="11441160" progId="Photoshop.Image.15">
+                <p:oleObj spid="_x0000_s35844" name="Image" r:id="rId3" imgW="23834880" imgH="11441160" progId="Photoshop.Image.15">
                   <p:embed/>
                 </p:oleObj>
               </mc:Choice>
@@ -11594,7 +11598,7 @@
           <a:graphicData uri="http://schemas.openxmlformats.org/presentationml/2006/ole">
             <mc:AlternateContent xmlns:mc="http://schemas.openxmlformats.org/markup-compatibility/2006">
               <mc:Choice xmlns:v="urn:schemas-microsoft-com:vml" Requires="v">
-                <p:oleObj spid="_x0000_s23560" name="Image" r:id="rId3" imgW="18806040" imgH="5904720" progId="Photoshop.Image.15">
+                <p:oleObj spid="_x0000_s23561" name="Image" r:id="rId3" imgW="18806040" imgH="5904720" progId="Photoshop.Image.15">
                   <p:embed/>
                 </p:oleObj>
               </mc:Choice>
@@ -12088,7 +12092,7 @@
           <a:graphicData uri="http://schemas.openxmlformats.org/presentationml/2006/ole">
             <mc:AlternateContent xmlns:mc="http://schemas.openxmlformats.org/markup-compatibility/2006">
               <mc:Choice xmlns:v="urn:schemas-microsoft-com:vml" Requires="v">
-                <p:oleObj spid="_x0000_s24589" name="Image" r:id="rId3" imgW="4253760" imgH="5434920" progId="Photoshop.Image.15">
+                <p:oleObj spid="_x0000_s24591" name="Image" r:id="rId3" imgW="4253760" imgH="5434920" progId="Photoshop.Image.15">
                   <p:embed/>
                 </p:oleObj>
               </mc:Choice>
@@ -12145,7 +12149,7 @@
           <a:graphicData uri="http://schemas.openxmlformats.org/presentationml/2006/ole">
             <mc:AlternateContent xmlns:mc="http://schemas.openxmlformats.org/markup-compatibility/2006">
               <mc:Choice xmlns:v="urn:schemas-microsoft-com:vml" Requires="v">
-                <p:oleObj spid="_x0000_s24590" name="Image" r:id="rId5" imgW="4914000" imgH="5371200" progId="Photoshop.Image.15">
+                <p:oleObj spid="_x0000_s24592" name="Image" r:id="rId5" imgW="4914000" imgH="5371200" progId="Photoshop.Image.15">
                   <p:embed/>
                 </p:oleObj>
               </mc:Choice>
@@ -12737,7 +12741,7 @@
             <a:graphicData uri="http://schemas.openxmlformats.org/presentationml/2006/ole">
               <mc:AlternateContent xmlns:mc="http://schemas.openxmlformats.org/markup-compatibility/2006">
                 <mc:Choice xmlns:v="urn:schemas-microsoft-com:vml" Requires="v">
-                  <p:oleObj spid="_x0000_s25607" name="Image" r:id="rId3" imgW="9688680" imgH="5904720" progId="Photoshop.Image.15">
+                  <p:oleObj spid="_x0000_s25608" name="Image" r:id="rId3" imgW="9688680" imgH="5904720" progId="Photoshop.Image.15">
                     <p:embed/>
                   </p:oleObj>
                 </mc:Choice>
@@ -13429,7 +13433,7 @@
           <a:graphicData uri="http://schemas.openxmlformats.org/presentationml/2006/ole">
             <mc:AlternateContent xmlns:mc="http://schemas.openxmlformats.org/markup-compatibility/2006">
               <mc:Choice xmlns:v="urn:schemas-microsoft-com:vml" Requires="v">
-                <p:oleObj spid="_x0000_s27670" name="Image" r:id="rId3" imgW="14793480" imgH="9701280" progId="Photoshop.Image.15">
+                <p:oleObj spid="_x0000_s27675" name="Image" r:id="rId3" imgW="14793480" imgH="9701280" progId="Photoshop.Image.15">
                   <p:embed/>
                 </p:oleObj>
               </mc:Choice>
@@ -13512,7 +13516,7 @@
           <a:graphicData uri="http://schemas.openxmlformats.org/presentationml/2006/ole">
             <mc:AlternateContent xmlns:mc="http://schemas.openxmlformats.org/markup-compatibility/2006">
               <mc:Choice xmlns:v="urn:schemas-microsoft-com:vml" Requires="v">
-                <p:oleObj spid="_x0000_s27671" name="Image" r:id="rId5" imgW="5333040" imgH="1942560" progId="Photoshop.Image.15">
+                <p:oleObj spid="_x0000_s27676" name="Image" r:id="rId5" imgW="5333040" imgH="1942560" progId="Photoshop.Image.15">
                   <p:embed/>
                 </p:oleObj>
               </mc:Choice>
@@ -13592,7 +13596,7 @@
           <a:graphicData uri="http://schemas.openxmlformats.org/presentationml/2006/ole">
             <mc:AlternateContent xmlns:mc="http://schemas.openxmlformats.org/markup-compatibility/2006">
               <mc:Choice xmlns:v="urn:schemas-microsoft-com:vml" Requires="v">
-                <p:oleObj spid="_x0000_s27672" name="Image" r:id="rId7" imgW="4787280" imgH="1282320" progId="Photoshop.Image.15">
+                <p:oleObj spid="_x0000_s27677" name="Image" r:id="rId7" imgW="4787280" imgH="1282320" progId="Photoshop.Image.15">
                   <p:embed/>
                 </p:oleObj>
               </mc:Choice>
@@ -13740,7 +13744,7 @@
           <a:graphicData uri="http://schemas.openxmlformats.org/presentationml/2006/ole">
             <mc:AlternateContent xmlns:mc="http://schemas.openxmlformats.org/markup-compatibility/2006">
               <mc:Choice xmlns:v="urn:schemas-microsoft-com:vml" Requires="v">
-                <p:oleObj spid="_x0000_s27673" name="Image" r:id="rId9" imgW="3555360" imgH="1549080" progId="Photoshop.Image.15">
+                <p:oleObj spid="_x0000_s27678" name="Image" r:id="rId9" imgW="3555360" imgH="1549080" progId="Photoshop.Image.15">
                   <p:embed/>
                 </p:oleObj>
               </mc:Choice>
@@ -13820,7 +13824,7 @@
           <a:graphicData uri="http://schemas.openxmlformats.org/presentationml/2006/ole">
             <mc:AlternateContent xmlns:mc="http://schemas.openxmlformats.org/markup-compatibility/2006">
               <mc:Choice xmlns:v="urn:schemas-microsoft-com:vml" Requires="v">
-                <p:oleObj spid="_x0000_s27674" name="Image" r:id="rId11" imgW="5498280" imgH="2221920" progId="Photoshop.Image.15">
+                <p:oleObj spid="_x0000_s27679" name="Image" r:id="rId11" imgW="5498280" imgH="2221920" progId="Photoshop.Image.15">
                   <p:embed/>
                 </p:oleObj>
               </mc:Choice>

</xml_diff>

<commit_message>
screenshots aktualisiert, tabellenüberschrift korrigiert
</commit_message>
<xml_diff>
--- a/aws_ha1.pptx
+++ b/aws_ha1.pptx
@@ -796,7 +796,7 @@
           <a:graphicData uri="http://schemas.openxmlformats.org/presentationml/2006/ole">
             <mc:AlternateContent xmlns:mc="http://schemas.openxmlformats.org/markup-compatibility/2006">
               <mc:Choice xmlns:v="urn:schemas-microsoft-com:vml" Requires="v">
-                <p:oleObj spid="_x0000_s4164" r:id="rId9" imgW="0" imgH="0" progId="TCLayout.ActiveDocument.1">
+                <p:oleObj spid="_x0000_s4167" r:id="rId9" imgW="0" imgH="0" progId="TCLayout.ActiveDocument.1">
                   <p:embed/>
                 </p:oleObj>
               </mc:Choice>
@@ -3340,7 +3340,7 @@
           <a:graphicData uri="http://schemas.openxmlformats.org/presentationml/2006/ole">
             <mc:AlternateContent xmlns:mc="http://schemas.openxmlformats.org/markup-compatibility/2006">
               <mc:Choice xmlns:v="urn:schemas-microsoft-com:vml" Requires="v">
-                <p:oleObj spid="_x0000_s1096" r:id="rId21" imgW="0" imgH="0" progId="TCLayout.ActiveDocument.1">
+                <p:oleObj spid="_x0000_s1099" r:id="rId21" imgW="0" imgH="0" progId="TCLayout.ActiveDocument.1">
                   <p:embed/>
                 </p:oleObj>
               </mc:Choice>
@@ -4020,7 +4020,7 @@
           <a:graphicData uri="http://schemas.openxmlformats.org/presentationml/2006/ole">
             <mc:AlternateContent xmlns:mc="http://schemas.openxmlformats.org/markup-compatibility/2006">
               <mc:Choice xmlns:v="urn:schemas-microsoft-com:vml" Requires="v">
-                <p:oleObj spid="_x0000_s28689" name="Image" r:id="rId3" imgW="19974600" imgH="11314080" progId="Photoshop.Image.15">
+                <p:oleObj spid="_x0000_s28698" name="Image" r:id="rId3" imgW="19974600" imgH="11314080" progId="Photoshop.Image.15">
                   <p:embed/>
                 </p:oleObj>
               </mc:Choice>
@@ -4396,7 +4396,7 @@
           <a:graphicData uri="http://schemas.openxmlformats.org/presentationml/2006/ole">
             <mc:AlternateContent xmlns:mc="http://schemas.openxmlformats.org/markup-compatibility/2006">
               <mc:Choice xmlns:v="urn:schemas-microsoft-com:vml" Requires="v">
-                <p:oleObj spid="_x0000_s28690" name="Image" r:id="rId5" imgW="3758400" imgH="7085520" progId="Photoshop.Image.15">
+                <p:oleObj spid="_x0000_s28699" name="Image" r:id="rId5" imgW="3758400" imgH="7085520" progId="Photoshop.Image.15">
                   <p:embed/>
                 </p:oleObj>
               </mc:Choice>
@@ -4487,7 +4487,7 @@
           <a:graphicData uri="http://schemas.openxmlformats.org/presentationml/2006/ole">
             <mc:AlternateContent xmlns:mc="http://schemas.openxmlformats.org/markup-compatibility/2006">
               <mc:Choice xmlns:v="urn:schemas-microsoft-com:vml" Requires="v">
-                <p:oleObj spid="_x0000_s28691" name="Image" r:id="rId7" imgW="4977720" imgH="3656880" progId="Photoshop.Image.15">
+                <p:oleObj spid="_x0000_s28700" name="Image" r:id="rId7" imgW="4977720" imgH="3656880" progId="Photoshop.Image.15">
                   <p:embed/>
                 </p:oleObj>
               </mc:Choice>
@@ -5171,7 +5171,7 @@
           <a:graphicData uri="http://schemas.openxmlformats.org/presentationml/2006/ole">
             <mc:AlternateContent xmlns:mc="http://schemas.openxmlformats.org/markup-compatibility/2006">
               <mc:Choice xmlns:v="urn:schemas-microsoft-com:vml" Requires="v">
-                <p:oleObj spid="_x0000_s29705" name="Image" r:id="rId3" imgW="24304680" imgH="11491920" progId="Photoshop.Image.15">
+                <p:oleObj spid="_x0000_s29708" name="Image" r:id="rId3" imgW="24304680" imgH="11491920" progId="Photoshop.Image.15">
                   <p:embed/>
                 </p:oleObj>
               </mc:Choice>
@@ -5920,7 +5920,7 @@
           <a:graphicData uri="http://schemas.openxmlformats.org/presentationml/2006/ole">
             <mc:AlternateContent xmlns:mc="http://schemas.openxmlformats.org/markup-compatibility/2006">
               <mc:Choice xmlns:v="urn:schemas-microsoft-com:vml" Requires="v">
-                <p:oleObj spid="_x0000_s30746" name="Image" r:id="rId3" imgW="4926960" imgH="2768040" progId="Photoshop.Image.15">
+                <p:oleObj spid="_x0000_s30758" name="Image" r:id="rId3" imgW="4926960" imgH="2768040" progId="Photoshop.Image.15">
                   <p:embed/>
                 </p:oleObj>
               </mc:Choice>
@@ -5978,7 +5978,7 @@
           <a:graphicData uri="http://schemas.openxmlformats.org/presentationml/2006/ole">
             <mc:AlternateContent xmlns:mc="http://schemas.openxmlformats.org/markup-compatibility/2006">
               <mc:Choice xmlns:v="urn:schemas-microsoft-com:vml" Requires="v">
-                <p:oleObj spid="_x0000_s30747" name="Image" r:id="rId5" imgW="7885440" imgH="1180800" progId="Photoshop.Image.15">
+                <p:oleObj spid="_x0000_s30759" name="Image" r:id="rId5" imgW="7885440" imgH="1180800" progId="Photoshop.Image.15">
                   <p:embed/>
                 </p:oleObj>
               </mc:Choice>
@@ -6035,7 +6035,7 @@
           <a:graphicData uri="http://schemas.openxmlformats.org/presentationml/2006/ole">
             <mc:AlternateContent xmlns:mc="http://schemas.openxmlformats.org/markup-compatibility/2006">
               <mc:Choice xmlns:v="urn:schemas-microsoft-com:vml" Requires="v">
-                <p:oleObj spid="_x0000_s30748" name="Image" r:id="rId7" imgW="7542720" imgH="1231560" progId="Photoshop.Image.15">
+                <p:oleObj spid="_x0000_s30760" name="Image" r:id="rId7" imgW="7542720" imgH="1231560" progId="Photoshop.Image.15">
                   <p:embed/>
                 </p:oleObj>
               </mc:Choice>
@@ -6092,7 +6092,7 @@
           <a:graphicData uri="http://schemas.openxmlformats.org/presentationml/2006/ole">
             <mc:AlternateContent xmlns:mc="http://schemas.openxmlformats.org/markup-compatibility/2006">
               <mc:Choice xmlns:v="urn:schemas-microsoft-com:vml" Requires="v">
-                <p:oleObj spid="_x0000_s30749" name="Image" r:id="rId9" imgW="8507880" imgH="1244160" progId="Photoshop.Image.15">
+                <p:oleObj spid="_x0000_s30761" name="Image" r:id="rId9" imgW="8507880" imgH="1244160" progId="Photoshop.Image.15">
                   <p:embed/>
                 </p:oleObj>
               </mc:Choice>
@@ -6710,7 +6710,7 @@
           <a:graphicData uri="http://schemas.openxmlformats.org/presentationml/2006/ole">
             <mc:AlternateContent xmlns:mc="http://schemas.openxmlformats.org/markup-compatibility/2006">
               <mc:Choice xmlns:v="urn:schemas-microsoft-com:vml" Requires="v">
-                <p:oleObj spid="_x0000_s31756" name="Image" r:id="rId3" imgW="4926960" imgH="2768040" progId="Photoshop.Image.15">
+                <p:oleObj spid="_x0000_s31762" name="Image" r:id="rId3" imgW="4926960" imgH="2768040" progId="Photoshop.Image.15">
                   <p:embed/>
                 </p:oleObj>
               </mc:Choice>
@@ -7000,7 +7000,7 @@
           <a:graphicData uri="http://schemas.openxmlformats.org/presentationml/2006/ole">
             <mc:AlternateContent xmlns:mc="http://schemas.openxmlformats.org/markup-compatibility/2006">
               <mc:Choice xmlns:v="urn:schemas-microsoft-com:vml" Requires="v">
-                <p:oleObj spid="_x0000_s31757" name="Image" r:id="rId5" imgW="19110960" imgH="2247480" progId="Photoshop.Image.15">
+                <p:oleObj spid="_x0000_s31763" name="Image" r:id="rId5" imgW="19110960" imgH="2247480" progId="Photoshop.Image.15">
                   <p:embed/>
                 </p:oleObj>
               </mc:Choice>
@@ -7087,7 +7087,7 @@
           <a:graphicData uri="http://schemas.openxmlformats.org/presentationml/2006/ole">
             <mc:AlternateContent xmlns:mc="http://schemas.openxmlformats.org/markup-compatibility/2006">
               <mc:Choice xmlns:v="urn:schemas-microsoft-com:vml" Requires="v">
-                <p:oleObj spid="_x0000_s32778" name="Image" r:id="rId3" imgW="12304440" imgH="3999960" progId="Photoshop.Image.15">
+                <p:oleObj spid="_x0000_s32784" name="Image" r:id="rId3" imgW="12304440" imgH="3999960" progId="Photoshop.Image.15">
                   <p:embed/>
                 </p:oleObj>
               </mc:Choice>
@@ -7370,7 +7370,7 @@
           <a:graphicData uri="http://schemas.openxmlformats.org/presentationml/2006/ole">
             <mc:AlternateContent xmlns:mc="http://schemas.openxmlformats.org/markup-compatibility/2006">
               <mc:Choice xmlns:v="urn:schemas-microsoft-com:vml" Requires="v">
-                <p:oleObj spid="_x0000_s32779" name="Image" r:id="rId5" imgW="4926960" imgH="2768040" progId="Photoshop.Image.15">
+                <p:oleObj spid="_x0000_s32785" name="Image" r:id="rId5" imgW="4926960" imgH="2768040" progId="Photoshop.Image.15">
                   <p:embed/>
                 </p:oleObj>
               </mc:Choice>
@@ -7916,7 +7916,7 @@
           <a:graphicData uri="http://schemas.openxmlformats.org/presentationml/2006/ole">
             <mc:AlternateContent xmlns:mc="http://schemas.openxmlformats.org/markup-compatibility/2006">
               <mc:Choice xmlns:v="urn:schemas-microsoft-com:vml" Requires="v">
-                <p:oleObj spid="_x0000_s33798" name="Image" r:id="rId3" imgW="23415840" imgH="11504520" progId="Photoshop.Image.15">
+                <p:oleObj spid="_x0000_s33801" name="Image" r:id="rId3" imgW="23415840" imgH="11504520" progId="Photoshop.Image.15">
                   <p:embed/>
                 </p:oleObj>
               </mc:Choice>
@@ -7981,63 +7981,6 @@
           <a:chExt cx="0" cy="0"/>
         </a:xfrm>
       </p:grpSpPr>
-      <p:graphicFrame>
-        <p:nvGraphicFramePr>
-          <p:cNvPr id="4" name="Objekt 3"/>
-          <p:cNvGraphicFramePr>
-            <a:graphicFrameLocks noChangeAspect="1"/>
-          </p:cNvGraphicFramePr>
-          <p:nvPr>
-            <p:extLst>
-              <p:ext uri="{D42A27DB-BD31-4B8C-83A1-F6EECF244321}">
-                <p14:modId xmlns:p14="http://schemas.microsoft.com/office/powerpoint/2010/main" val="3175217271"/>
-              </p:ext>
-            </p:extLst>
-          </p:nvPr>
-        </p:nvGraphicFramePr>
-        <p:xfrm>
-          <a:off x="179512" y="2003792"/>
-          <a:ext cx="8784976" cy="4255223"/>
-        </p:xfrm>
-        <a:graphic>
-          <a:graphicData uri="http://schemas.openxmlformats.org/presentationml/2006/ole">
-            <mc:AlternateContent xmlns:mc="http://schemas.openxmlformats.org/markup-compatibility/2006">
-              <mc:Choice xmlns:v="urn:schemas-microsoft-com:vml" Requires="v">
-                <p:oleObj spid="_x0000_s34821" name="Image" r:id="rId3" imgW="24152040" imgH="11669760" progId="Photoshop.Image.15">
-                  <p:embed/>
-                </p:oleObj>
-              </mc:Choice>
-              <mc:Fallback>
-                <p:oleObj name="Image" r:id="rId3" imgW="24152040" imgH="11669760" progId="Photoshop.Image.15">
-                  <p:embed/>
-                  <p:pic>
-                    <p:nvPicPr>
-                      <p:cNvPr id="0" name=""/>
-                      <p:cNvPicPr/>
-                      <p:nvPr/>
-                    </p:nvPicPr>
-                    <p:blipFill>
-                      <a:blip r:embed="rId4"/>
-                      <a:stretch>
-                        <a:fillRect/>
-                      </a:stretch>
-                    </p:blipFill>
-                    <p:spPr>
-                      <a:xfrm>
-                        <a:off x="179512" y="2003792"/>
-                        <a:ext cx="8784976" cy="4255223"/>
-                      </a:xfrm>
-                      <a:prstGeom prst="rect">
-                        <a:avLst/>
-                      </a:prstGeom>
-                    </p:spPr>
-                  </p:pic>
-                </p:oleObj>
-              </mc:Fallback>
-            </mc:AlternateContent>
-          </a:graphicData>
-        </a:graphic>
-      </p:graphicFrame>
       <p:sp>
         <p:nvSpPr>
           <p:cNvPr id="3" name="Inhaltsplatzhalter 2"/>
@@ -8231,6 +8174,63 @@
           </a:p>
         </p:txBody>
       </p:sp>
+      <p:graphicFrame>
+        <p:nvGraphicFramePr>
+          <p:cNvPr id="7" name="Objekt 6"/>
+          <p:cNvGraphicFramePr>
+            <a:graphicFrameLocks noChangeAspect="1"/>
+          </p:cNvGraphicFramePr>
+          <p:nvPr>
+            <p:extLst>
+              <p:ext uri="{D42A27DB-BD31-4B8C-83A1-F6EECF244321}">
+                <p14:modId xmlns:p14="http://schemas.microsoft.com/office/powerpoint/2010/main" val="1887385488"/>
+              </p:ext>
+            </p:extLst>
+          </p:nvPr>
+        </p:nvGraphicFramePr>
+        <p:xfrm>
+          <a:off x="1259632" y="1997713"/>
+          <a:ext cx="6234906" cy="4205288"/>
+        </p:xfrm>
+        <a:graphic>
+          <a:graphicData uri="http://schemas.openxmlformats.org/presentationml/2006/ole">
+            <mc:AlternateContent xmlns:mc="http://schemas.openxmlformats.org/markup-compatibility/2006">
+              <mc:Choice xmlns:v="urn:schemas-microsoft-com:vml" Requires="v">
+                <p:oleObj spid="_x0000_s34824" name="Image" r:id="rId3" imgW="15631560" imgH="10514160" progId="Photoshop.Image.15">
+                  <p:embed/>
+                </p:oleObj>
+              </mc:Choice>
+              <mc:Fallback>
+                <p:oleObj name="Image" r:id="rId3" imgW="15631560" imgH="10514160" progId="Photoshop.Image.15">
+                  <p:embed/>
+                  <p:pic>
+                    <p:nvPicPr>
+                      <p:cNvPr id="2" name="Objekt 1"/>
+                      <p:cNvPicPr/>
+                      <p:nvPr/>
+                    </p:nvPicPr>
+                    <p:blipFill>
+                      <a:blip r:embed="rId4"/>
+                      <a:stretch>
+                        <a:fillRect/>
+                      </a:stretch>
+                    </p:blipFill>
+                    <p:spPr>
+                      <a:xfrm>
+                        <a:off x="1259632" y="1997713"/>
+                        <a:ext cx="6234906" cy="4205288"/>
+                      </a:xfrm>
+                      <a:prstGeom prst="rect">
+                        <a:avLst/>
+                      </a:prstGeom>
+                    </p:spPr>
+                  </p:pic>
+                </p:oleObj>
+              </mc:Fallback>
+            </mc:AlternateContent>
+          </a:graphicData>
+        </a:graphic>
+      </p:graphicFrame>
     </p:spTree>
     <p:extLst>
       <p:ext uri="{BB962C8B-B14F-4D97-AF65-F5344CB8AC3E}">
@@ -8456,32 +8456,32 @@
       </p:sp>
       <p:graphicFrame>
         <p:nvGraphicFramePr>
-          <p:cNvPr id="4" name="Objekt 3"/>
+          <p:cNvPr id="7" name="Objekt 6"/>
           <p:cNvGraphicFramePr>
             <a:graphicFrameLocks noChangeAspect="1"/>
           </p:cNvGraphicFramePr>
           <p:nvPr>
             <p:extLst>
               <p:ext uri="{D42A27DB-BD31-4B8C-83A1-F6EECF244321}">
-                <p14:modId xmlns:p14="http://schemas.microsoft.com/office/powerpoint/2010/main" val="2219660872"/>
+                <p14:modId xmlns:p14="http://schemas.microsoft.com/office/powerpoint/2010/main" val="2177862428"/>
               </p:ext>
             </p:extLst>
           </p:nvPr>
         </p:nvGraphicFramePr>
         <p:xfrm>
-          <a:off x="179512" y="1887859"/>
-          <a:ext cx="8606136" cy="4141703"/>
+          <a:off x="179512" y="2033399"/>
+          <a:ext cx="8519052" cy="4135290"/>
         </p:xfrm>
         <a:graphic>
           <a:graphicData uri="http://schemas.openxmlformats.org/presentationml/2006/ole">
             <mc:AlternateContent xmlns:mc="http://schemas.openxmlformats.org/markup-compatibility/2006">
               <mc:Choice xmlns:v="urn:schemas-microsoft-com:vml" Requires="v">
-                <p:oleObj spid="_x0000_s35844" name="Image" r:id="rId3" imgW="23834880" imgH="11441160" progId="Photoshop.Image.15">
+                <p:oleObj spid="_x0000_s35847" name="Image" r:id="rId3" imgW="23961600" imgH="11606040" progId="Photoshop.Image.15">
                   <p:embed/>
                 </p:oleObj>
               </mc:Choice>
               <mc:Fallback>
-                <p:oleObj name="Image" r:id="rId3" imgW="23834880" imgH="11441160" progId="Photoshop.Image.15">
+                <p:oleObj name="Image" r:id="rId3" imgW="23961600" imgH="11606040" progId="Photoshop.Image.15">
                   <p:embed/>
                   <p:pic>
                     <p:nvPicPr>
@@ -8497,8 +8497,8 @@
                     </p:blipFill>
                     <p:spPr>
                       <a:xfrm>
-                        <a:off x="179512" y="1887859"/>
-                        <a:ext cx="8606136" cy="4141703"/>
+                        <a:off x="179512" y="2033399"/>
+                        <a:ext cx="8519052" cy="4135290"/>
                       </a:xfrm>
                       <a:prstGeom prst="rect">
                         <a:avLst/>
@@ -11578,32 +11578,32 @@
       </p:sp>
       <p:graphicFrame>
         <p:nvGraphicFramePr>
-          <p:cNvPr id="15" name="Objekt 14"/>
+          <p:cNvPr id="2" name="Objekt 1"/>
           <p:cNvGraphicFramePr>
             <a:graphicFrameLocks noChangeAspect="1"/>
           </p:cNvGraphicFramePr>
           <p:nvPr>
             <p:extLst>
               <p:ext uri="{D42A27DB-BD31-4B8C-83A1-F6EECF244321}">
-                <p14:modId xmlns:p14="http://schemas.microsoft.com/office/powerpoint/2010/main" val="3289737979"/>
+                <p14:modId xmlns:p14="http://schemas.microsoft.com/office/powerpoint/2010/main" val="25393363"/>
               </p:ext>
             </p:extLst>
           </p:nvPr>
         </p:nvGraphicFramePr>
         <p:xfrm>
-          <a:off x="168475" y="3861048"/>
-          <a:ext cx="8796013" cy="2794842"/>
+          <a:off x="168475" y="3855877"/>
+          <a:ext cx="8724005" cy="2767585"/>
         </p:xfrm>
         <a:graphic>
           <a:graphicData uri="http://schemas.openxmlformats.org/presentationml/2006/ole">
             <mc:AlternateContent xmlns:mc="http://schemas.openxmlformats.org/markup-compatibility/2006">
               <mc:Choice xmlns:v="urn:schemas-microsoft-com:vml" Requires="v">
-                <p:oleObj spid="_x0000_s23561" name="Image" r:id="rId3" imgW="18806040" imgH="5904720" progId="Photoshop.Image.15">
+                <p:oleObj spid="_x0000_s23564" name="Image" r:id="rId3" imgW="19187280" imgH="5841000" progId="Photoshop.Image.15">
                   <p:embed/>
                 </p:oleObj>
               </mc:Choice>
               <mc:Fallback>
-                <p:oleObj name="Image" r:id="rId3" imgW="18806040" imgH="5904720" progId="Photoshop.Image.15">
+                <p:oleObj name="Image" r:id="rId3" imgW="19187280" imgH="5841000" progId="Photoshop.Image.15">
                   <p:embed/>
                   <p:pic>
                     <p:nvPicPr>
@@ -11619,8 +11619,8 @@
                     </p:blipFill>
                     <p:spPr>
                       <a:xfrm>
-                        <a:off x="168475" y="3861048"/>
-                        <a:ext cx="8796013" cy="2794842"/>
+                        <a:off x="168475" y="3855877"/>
+                        <a:ext cx="8724005" cy="2767585"/>
                       </a:xfrm>
                       <a:prstGeom prst="rect">
                         <a:avLst/>
@@ -12092,7 +12092,7 @@
           <a:graphicData uri="http://schemas.openxmlformats.org/presentationml/2006/ole">
             <mc:AlternateContent xmlns:mc="http://schemas.openxmlformats.org/markup-compatibility/2006">
               <mc:Choice xmlns:v="urn:schemas-microsoft-com:vml" Requires="v">
-                <p:oleObj spid="_x0000_s24591" name="Image" r:id="rId3" imgW="4253760" imgH="5434920" progId="Photoshop.Image.15">
+                <p:oleObj spid="_x0000_s24597" name="Image" r:id="rId3" imgW="4253760" imgH="5434920" progId="Photoshop.Image.15">
                   <p:embed/>
                 </p:oleObj>
               </mc:Choice>
@@ -12149,7 +12149,7 @@
           <a:graphicData uri="http://schemas.openxmlformats.org/presentationml/2006/ole">
             <mc:AlternateContent xmlns:mc="http://schemas.openxmlformats.org/markup-compatibility/2006">
               <mc:Choice xmlns:v="urn:schemas-microsoft-com:vml" Requires="v">
-                <p:oleObj spid="_x0000_s24592" name="Image" r:id="rId5" imgW="4914000" imgH="5371200" progId="Photoshop.Image.15">
+                <p:oleObj spid="_x0000_s24598" name="Image" r:id="rId5" imgW="4914000" imgH="5371200" progId="Photoshop.Image.15">
                   <p:embed/>
                 </p:oleObj>
               </mc:Choice>
@@ -12741,7 +12741,7 @@
             <a:graphicData uri="http://schemas.openxmlformats.org/presentationml/2006/ole">
               <mc:AlternateContent xmlns:mc="http://schemas.openxmlformats.org/markup-compatibility/2006">
                 <mc:Choice xmlns:v="urn:schemas-microsoft-com:vml" Requires="v">
-                  <p:oleObj spid="_x0000_s25608" name="Image" r:id="rId3" imgW="9688680" imgH="5904720" progId="Photoshop.Image.15">
+                  <p:oleObj spid="_x0000_s25613" name="Image" r:id="rId3" imgW="9688680" imgH="5904720" progId="Photoshop.Image.15">
                     <p:embed/>
                   </p:oleObj>
                 </mc:Choice>
@@ -12810,6 +12810,63 @@
           </p:txBody>
         </p:sp>
       </p:grpSp>
+      <p:graphicFrame>
+        <p:nvGraphicFramePr>
+          <p:cNvPr id="2" name="Objekt 1"/>
+          <p:cNvGraphicFramePr>
+            <a:graphicFrameLocks noChangeAspect="1"/>
+          </p:cNvGraphicFramePr>
+          <p:nvPr>
+            <p:extLst>
+              <p:ext uri="{D42A27DB-BD31-4B8C-83A1-F6EECF244321}">
+                <p14:modId xmlns:p14="http://schemas.microsoft.com/office/powerpoint/2010/main" val="1176484339"/>
+              </p:ext>
+            </p:extLst>
+          </p:nvPr>
+        </p:nvGraphicFramePr>
+        <p:xfrm>
+          <a:off x="2136776" y="3461591"/>
+          <a:ext cx="4870450" cy="2987569"/>
+        </p:xfrm>
+        <a:graphic>
+          <a:graphicData uri="http://schemas.openxmlformats.org/presentationml/2006/ole">
+            <mc:AlternateContent xmlns:mc="http://schemas.openxmlformats.org/markup-compatibility/2006">
+              <mc:Choice xmlns:v="urn:schemas-microsoft-com:vml" Requires="v">
+                <p:oleObj spid="_x0000_s25614" name="Image" r:id="rId5" imgW="11872800" imgH="6971400" progId="Photoshop.Image.15">
+                  <p:embed/>
+                </p:oleObj>
+              </mc:Choice>
+              <mc:Fallback>
+                <p:oleObj name="Image" r:id="rId5" imgW="11872800" imgH="6971400" progId="Photoshop.Image.15">
+                  <p:embed/>
+                  <p:pic>
+                    <p:nvPicPr>
+                      <p:cNvPr id="0" name=""/>
+                      <p:cNvPicPr/>
+                      <p:nvPr/>
+                    </p:nvPicPr>
+                    <p:blipFill>
+                      <a:blip r:embed="rId6"/>
+                      <a:stretch>
+                        <a:fillRect/>
+                      </a:stretch>
+                    </p:blipFill>
+                    <p:spPr>
+                      <a:xfrm>
+                        <a:off x="2136776" y="3461591"/>
+                        <a:ext cx="4870450" cy="2987569"/>
+                      </a:xfrm>
+                      <a:prstGeom prst="rect">
+                        <a:avLst/>
+                      </a:prstGeom>
+                    </p:spPr>
+                  </p:pic>
+                </p:oleObj>
+              </mc:Fallback>
+            </mc:AlternateContent>
+          </a:graphicData>
+        </a:graphic>
+      </p:graphicFrame>
     </p:spTree>
     <p:extLst>
       <p:ext uri="{BB962C8B-B14F-4D97-AF65-F5344CB8AC3E}">
@@ -13433,7 +13490,7 @@
           <a:graphicData uri="http://schemas.openxmlformats.org/presentationml/2006/ole">
             <mc:AlternateContent xmlns:mc="http://schemas.openxmlformats.org/markup-compatibility/2006">
               <mc:Choice xmlns:v="urn:schemas-microsoft-com:vml" Requires="v">
-                <p:oleObj spid="_x0000_s27675" name="Image" r:id="rId3" imgW="14793480" imgH="9701280" progId="Photoshop.Image.15">
+                <p:oleObj spid="_x0000_s27690" name="Image" r:id="rId3" imgW="14793480" imgH="9701280" progId="Photoshop.Image.15">
                   <p:embed/>
                 </p:oleObj>
               </mc:Choice>
@@ -13516,7 +13573,7 @@
           <a:graphicData uri="http://schemas.openxmlformats.org/presentationml/2006/ole">
             <mc:AlternateContent xmlns:mc="http://schemas.openxmlformats.org/markup-compatibility/2006">
               <mc:Choice xmlns:v="urn:schemas-microsoft-com:vml" Requires="v">
-                <p:oleObj spid="_x0000_s27676" name="Image" r:id="rId5" imgW="5333040" imgH="1942560" progId="Photoshop.Image.15">
+                <p:oleObj spid="_x0000_s27691" name="Image" r:id="rId5" imgW="5333040" imgH="1942560" progId="Photoshop.Image.15">
                   <p:embed/>
                 </p:oleObj>
               </mc:Choice>
@@ -13596,7 +13653,7 @@
           <a:graphicData uri="http://schemas.openxmlformats.org/presentationml/2006/ole">
             <mc:AlternateContent xmlns:mc="http://schemas.openxmlformats.org/markup-compatibility/2006">
               <mc:Choice xmlns:v="urn:schemas-microsoft-com:vml" Requires="v">
-                <p:oleObj spid="_x0000_s27677" name="Image" r:id="rId7" imgW="4787280" imgH="1282320" progId="Photoshop.Image.15">
+                <p:oleObj spid="_x0000_s27692" name="Image" r:id="rId7" imgW="4787280" imgH="1282320" progId="Photoshop.Image.15">
                   <p:embed/>
                 </p:oleObj>
               </mc:Choice>
@@ -13744,7 +13801,7 @@
           <a:graphicData uri="http://schemas.openxmlformats.org/presentationml/2006/ole">
             <mc:AlternateContent xmlns:mc="http://schemas.openxmlformats.org/markup-compatibility/2006">
               <mc:Choice xmlns:v="urn:schemas-microsoft-com:vml" Requires="v">
-                <p:oleObj spid="_x0000_s27678" name="Image" r:id="rId9" imgW="3555360" imgH="1549080" progId="Photoshop.Image.15">
+                <p:oleObj spid="_x0000_s27693" name="Image" r:id="rId9" imgW="3555360" imgH="1549080" progId="Photoshop.Image.15">
                   <p:embed/>
                 </p:oleObj>
               </mc:Choice>
@@ -13824,7 +13881,7 @@
           <a:graphicData uri="http://schemas.openxmlformats.org/presentationml/2006/ole">
             <mc:AlternateContent xmlns:mc="http://schemas.openxmlformats.org/markup-compatibility/2006">
               <mc:Choice xmlns:v="urn:schemas-microsoft-com:vml" Requires="v">
-                <p:oleObj spid="_x0000_s27679" name="Image" r:id="rId11" imgW="5498280" imgH="2221920" progId="Photoshop.Image.15">
+                <p:oleObj spid="_x0000_s27694" name="Image" r:id="rId11" imgW="5498280" imgH="2221920" progId="Photoshop.Image.15">
                   <p:embed/>
                 </p:oleObj>
               </mc:Choice>

</xml_diff>